<commit_message>
renaming some files and finally complete!
</commit_message>
<xml_diff>
--- a/intro-to-ds/ab-testing/analyze-a_b-test-results.pptx
+++ b/intro-to-ds/ab-testing/analyze-a_b-test-results.pptx
@@ -5,32 +5,31 @@
     <p:sldMasterId id="2147483661" r:id="rId1"/>
   </p:sldMasterIdLst>
   <p:notesMasterIdLst>
-    <p:notesMasterId r:id="rId8"/>
+    <p:notesMasterId r:id="rId7"/>
   </p:notesMasterIdLst>
   <p:sldIdLst>
-    <p:sldId id="256" r:id="rId2"/>
-    <p:sldId id="257" r:id="rId3"/>
-    <p:sldId id="258" r:id="rId4"/>
-    <p:sldId id="259" r:id="rId5"/>
-    <p:sldId id="260" r:id="rId6"/>
-    <p:sldId id="261" r:id="rId7"/>
+    <p:sldId id="257" r:id="rId2"/>
+    <p:sldId id="258" r:id="rId3"/>
+    <p:sldId id="259" r:id="rId4"/>
+    <p:sldId id="260" r:id="rId5"/>
+    <p:sldId id="261" r:id="rId6"/>
   </p:sldIdLst>
   <p:sldSz cx="9144000" cy="5143500" type="screen16x9"/>
   <p:notesSz cx="6858000" cy="9144000"/>
   <p:embeddedFontLst>
     <p:embeddedFont>
       <p:font typeface="Cambria" panose="02040503050406030204" pitchFamily="18" charset="0"/>
-      <p:regular r:id="rId9"/>
-      <p:bold r:id="rId10"/>
-      <p:italic r:id="rId11"/>
-      <p:boldItalic r:id="rId12"/>
+      <p:regular r:id="rId8"/>
+      <p:bold r:id="rId9"/>
+      <p:italic r:id="rId10"/>
+      <p:boldItalic r:id="rId11"/>
     </p:embeddedFont>
     <p:embeddedFont>
       <p:font typeface="Open Sans" panose="020B0606030504020204" pitchFamily="34" charset="0"/>
-      <p:regular r:id="rId13"/>
-      <p:bold r:id="rId14"/>
-      <p:italic r:id="rId15"/>
-      <p:boldItalic r:id="rId16"/>
+      <p:regular r:id="rId12"/>
+      <p:bold r:id="rId13"/>
+      <p:italic r:id="rId14"/>
+      <p:boldItalic r:id="rId15"/>
     </p:embeddedFont>
   </p:embeddedFontLst>
   <p:defaultTextStyle>
@@ -727,110 +726,6 @@
   <p:cSld>
     <p:spTree>
       <p:nvGrpSpPr>
-        <p:cNvPr id="1" name="Shape 60"/>
-        <p:cNvGrpSpPr/>
-        <p:nvPr/>
-      </p:nvGrpSpPr>
-      <p:grpSpPr>
-        <a:xfrm>
-          <a:off x="0" y="0"/>
-          <a:ext cx="0" cy="0"/>
-          <a:chOff x="0" y="0"/>
-          <a:chExt cx="0" cy="0"/>
-        </a:xfrm>
-      </p:grpSpPr>
-      <p:sp>
-        <p:nvSpPr>
-          <p:cNvPr id="61" name="Google Shape;61;g1f18ce3f467_0_258:notes"/>
-          <p:cNvSpPr>
-            <a:spLocks noGrp="1" noRot="1" noChangeAspect="1"/>
-          </p:cNvSpPr>
-          <p:nvPr>
-            <p:ph type="sldImg" idx="2"/>
-          </p:nvPr>
-        </p:nvSpPr>
-        <p:spPr>
-          <a:xfrm>
-            <a:off x="381300" y="685800"/>
-            <a:ext cx="6096000" cy="3429000"/>
-          </a:xfrm>
-          <a:custGeom>
-            <a:avLst/>
-            <a:gdLst/>
-            <a:ahLst/>
-            <a:cxnLst/>
-            <a:rect l="l" t="t" r="r" b="b"/>
-            <a:pathLst>
-              <a:path w="120000" h="120000" extrusionOk="0">
-                <a:moveTo>
-                  <a:pt x="0" y="0"/>
-                </a:moveTo>
-                <a:lnTo>
-                  <a:pt x="120000" y="0"/>
-                </a:lnTo>
-                <a:lnTo>
-                  <a:pt x="120000" y="120000"/>
-                </a:lnTo>
-                <a:lnTo>
-                  <a:pt x="0" y="120000"/>
-                </a:lnTo>
-                <a:close/>
-              </a:path>
-            </a:pathLst>
-          </a:custGeom>
-        </p:spPr>
-      </p:sp>
-      <p:sp>
-        <p:nvSpPr>
-          <p:cNvPr id="62" name="Google Shape;62;g1f18ce3f467_0_258:notes"/>
-          <p:cNvSpPr txBox="1">
-            <a:spLocks noGrp="1"/>
-          </p:cNvSpPr>
-          <p:nvPr>
-            <p:ph type="body" idx="1"/>
-          </p:nvPr>
-        </p:nvSpPr>
-        <p:spPr>
-          <a:xfrm>
-            <a:off x="685800" y="4343400"/>
-            <a:ext cx="5486400" cy="4114800"/>
-          </a:xfrm>
-          <a:prstGeom prst="rect">
-            <a:avLst/>
-          </a:prstGeom>
-        </p:spPr>
-        <p:txBody>
-          <a:bodyPr spcFirstLastPara="1" wrap="square" lIns="91425" tIns="91425" rIns="91425" bIns="91425" anchor="t" anchorCtr="0">
-            <a:noAutofit/>
-          </a:bodyPr>
-          <a:lstStyle/>
-          <a:p>
-            <a:pPr marL="0" lvl="0" indent="0" algn="l" rtl="0">
-              <a:spcBef>
-                <a:spcPts val="0"/>
-              </a:spcBef>
-              <a:spcAft>
-                <a:spcPts val="0"/>
-              </a:spcAft>
-              <a:buNone/>
-            </a:pPr>
-            <a:endParaRPr/>
-          </a:p>
-        </p:txBody>
-      </p:sp>
-    </p:spTree>
-  </p:cSld>
-  <p:clrMapOvr>
-    <a:masterClrMapping/>
-  </p:clrMapOvr>
-</p:notes>
-</file>
-
-<file path=ppt/notesSlides/notesSlide2.xml><?xml version="1.0" encoding="utf-8"?>
-<p:notes xmlns:a="http://schemas.openxmlformats.org/drawingml/2006/main" xmlns:r="http://schemas.openxmlformats.org/officeDocument/2006/relationships" xmlns:p="http://schemas.openxmlformats.org/presentationml/2006/main" showMasterSp="0" showMasterPhAnim="0">
-  <p:cSld>
-    <p:spTree>
-      <p:nvGrpSpPr>
         <p:cNvPr id="1" name="Shape 65"/>
         <p:cNvGrpSpPr/>
         <p:nvPr/>
@@ -897,8 +792,8 @@
         </p:nvSpPr>
         <p:spPr>
           <a:xfrm>
-            <a:off x="1143000" y="685800"/>
-            <a:ext cx="4572000" cy="3429000"/>
+            <a:off x="381000" y="685800"/>
+            <a:ext cx="6096000" cy="3429000"/>
           </a:xfrm>
           <a:custGeom>
             <a:avLst/>
@@ -934,7 +829,7 @@
 </p:notes>
 </file>
 
-<file path=ppt/notesSlides/notesSlide3.xml><?xml version="1.0" encoding="utf-8"?>
+<file path=ppt/notesSlides/notesSlide2.xml><?xml version="1.0" encoding="utf-8"?>
 <p:notes xmlns:a="http://schemas.openxmlformats.org/drawingml/2006/main" xmlns:r="http://schemas.openxmlformats.org/officeDocument/2006/relationships" xmlns:p="http://schemas.openxmlformats.org/presentationml/2006/main" showMasterSp="0" showMasterPhAnim="0">
   <p:cSld>
     <p:spTree>
@@ -963,7 +858,7 @@
         </p:nvSpPr>
         <p:spPr>
           <a:xfrm>
-            <a:off x="381300" y="685800"/>
+            <a:off x="381000" y="685800"/>
             <a:ext cx="6096000" cy="3429000"/>
           </a:xfrm>
           <a:custGeom>
@@ -1038,7 +933,7 @@
 </p:notes>
 </file>
 
-<file path=ppt/notesSlides/notesSlide4.xml><?xml version="1.0" encoding="utf-8"?>
+<file path=ppt/notesSlides/notesSlide3.xml><?xml version="1.0" encoding="utf-8"?>
 <p:notes xmlns:a="http://schemas.openxmlformats.org/drawingml/2006/main" xmlns:r="http://schemas.openxmlformats.org/officeDocument/2006/relationships" xmlns:p="http://schemas.openxmlformats.org/presentationml/2006/main" showMasterSp="0" showMasterPhAnim="0">
   <p:cSld>
     <p:spTree>
@@ -1142,7 +1037,7 @@
 </p:notes>
 </file>
 
-<file path=ppt/notesSlides/notesSlide5.xml><?xml version="1.0" encoding="utf-8"?>
+<file path=ppt/notesSlides/notesSlide4.xml><?xml version="1.0" encoding="utf-8"?>
 <p:notes xmlns:a="http://schemas.openxmlformats.org/drawingml/2006/main" xmlns:r="http://schemas.openxmlformats.org/officeDocument/2006/relationships" xmlns:p="http://schemas.openxmlformats.org/presentationml/2006/main" showMasterSp="0" showMasterPhAnim="0">
   <p:cSld>
     <p:spTree>
@@ -1171,7 +1066,7 @@
         </p:nvSpPr>
         <p:spPr>
           <a:xfrm>
-            <a:off x="381300" y="685800"/>
+            <a:off x="381000" y="685800"/>
             <a:ext cx="6096000" cy="3429000"/>
           </a:xfrm>
           <a:custGeom>
@@ -1246,7 +1141,7 @@
 </p:notes>
 </file>
 
-<file path=ppt/notesSlides/notesSlide6.xml><?xml version="1.0" encoding="utf-8"?>
+<file path=ppt/notesSlides/notesSlide5.xml><?xml version="1.0" encoding="utf-8"?>
 <p:notes xmlns:a="http://schemas.openxmlformats.org/drawingml/2006/main" xmlns:r="http://schemas.openxmlformats.org/officeDocument/2006/relationships" xmlns:p="http://schemas.openxmlformats.org/presentationml/2006/main" showMasterSp="0" showMasterPhAnim="0">
   <p:cSld>
     <p:spTree>
@@ -1275,7 +1170,7 @@
         </p:nvSpPr>
         <p:spPr>
           <a:xfrm>
-            <a:off x="381300" y="685800"/>
+            <a:off x="381000" y="685800"/>
             <a:ext cx="6096000" cy="3429000"/>
           </a:xfrm>
           <a:custGeom>
@@ -7842,87 +7737,6 @@
   <p:cSld>
     <p:spTree>
       <p:nvGrpSpPr>
-        <p:cNvPr id="1" name="Shape 63"/>
-        <p:cNvGrpSpPr/>
-        <p:nvPr/>
-      </p:nvGrpSpPr>
-      <p:grpSpPr>
-        <a:xfrm>
-          <a:off x="0" y="0"/>
-          <a:ext cx="0" cy="0"/>
-          <a:chOff x="0" y="0"/>
-          <a:chExt cx="0" cy="0"/>
-        </a:xfrm>
-      </p:grpSpPr>
-      <p:sp>
-        <p:nvSpPr>
-          <p:cNvPr id="64" name="Google Shape;64;p15"/>
-          <p:cNvSpPr txBox="1"/>
-          <p:nvPr/>
-        </p:nvSpPr>
-        <p:spPr>
-          <a:xfrm>
-            <a:off x="84350" y="194000"/>
-            <a:ext cx="9144000" cy="1154400"/>
-          </a:xfrm>
-          <a:prstGeom prst="rect">
-            <a:avLst/>
-          </a:prstGeom>
-          <a:noFill/>
-          <a:ln>
-            <a:noFill/>
-          </a:ln>
-        </p:spPr>
-        <p:txBody>
-          <a:bodyPr spcFirstLastPara="1" wrap="square" lIns="91425" tIns="91425" rIns="91425" bIns="91425" anchor="t" anchorCtr="0">
-            <a:spAutoFit/>
-          </a:bodyPr>
-          <a:lstStyle/>
-          <a:p>
-            <a:pPr marL="0" lvl="0" indent="0" algn="l" rtl="0">
-              <a:spcBef>
-                <a:spcPts val="0"/>
-              </a:spcBef>
-              <a:spcAft>
-                <a:spcPts val="0"/>
-              </a:spcAft>
-              <a:buNone/>
-            </a:pPr>
-            <a:r>
-              <a:rPr lang="en" sz="3150" b="1">
-                <a:solidFill>
-                  <a:srgbClr val="073763"/>
-                </a:solidFill>
-                <a:highlight>
-                  <a:schemeClr val="lt1"/>
-                </a:highlight>
-              </a:rPr>
-              <a:t>Make A Copy Of This Deck And Update The Red Ink Based On Your Notebook Results</a:t>
-            </a:r>
-            <a:endParaRPr sz="100" b="1">
-              <a:solidFill>
-                <a:srgbClr val="073763"/>
-              </a:solidFill>
-              <a:highlight>
-                <a:schemeClr val="lt1"/>
-              </a:highlight>
-            </a:endParaRPr>
-          </a:p>
-        </p:txBody>
-      </p:sp>
-    </p:spTree>
-  </p:cSld>
-  <p:clrMapOvr>
-    <a:masterClrMapping/>
-  </p:clrMapOvr>
-</p:sld>
-</file>
-
-<file path=ppt/slides/slide2.xml><?xml version="1.0" encoding="utf-8"?>
-<p:sld xmlns:a="http://schemas.openxmlformats.org/drawingml/2006/main" xmlns:r="http://schemas.openxmlformats.org/officeDocument/2006/relationships" xmlns:p="http://schemas.openxmlformats.org/presentationml/2006/main">
-  <p:cSld>
-    <p:spTree>
-      <p:nvGrpSpPr>
         <p:cNvPr id="1" name="Shape 68"/>
         <p:cNvGrpSpPr/>
         <p:nvPr/>
@@ -8131,7 +7945,7 @@
               <a:buNone/>
             </a:pPr>
             <a:r>
-              <a:rPr lang="en" sz="4500">
+              <a:rPr lang="en" sz="4500" dirty="0">
                 <a:solidFill>
                   <a:srgbClr val="FFFFFF"/>
                 </a:solidFill>
@@ -8142,15 +7956,6 @@
               </a:rPr>
               <a:t>Analyze A/B Test Results</a:t>
             </a:r>
-            <a:endParaRPr sz="500">
-              <a:solidFill>
-                <a:srgbClr val="FFFFFF"/>
-              </a:solidFill>
-              <a:latin typeface="Open Sans"/>
-              <a:ea typeface="Open Sans"/>
-              <a:cs typeface="Open Sans"/>
-              <a:sym typeface="Open Sans"/>
-            </a:endParaRPr>
           </a:p>
         </p:txBody>
       </p:sp>
@@ -8162,7 +7967,7 @@
 </p:sld>
 </file>
 
-<file path=ppt/slides/slide3.xml><?xml version="1.0" encoding="utf-8"?>
+<file path=ppt/slides/slide2.xml><?xml version="1.0" encoding="utf-8"?>
 <p:sld xmlns:a="http://schemas.openxmlformats.org/drawingml/2006/main" xmlns:r="http://schemas.openxmlformats.org/officeDocument/2006/relationships" xmlns:p="http://schemas.openxmlformats.org/presentationml/2006/main">
   <p:cSld>
     <p:spTree>
@@ -8188,7 +7993,7 @@
         <p:spPr>
           <a:xfrm>
             <a:off x="118100" y="1020700"/>
-            <a:ext cx="9076500" cy="1535400"/>
+            <a:ext cx="9076500" cy="892522"/>
           </a:xfrm>
           <a:prstGeom prst="rect">
             <a:avLst/>
@@ -8219,7 +8024,7 @@
               <a:buNone/>
             </a:pPr>
             <a:r>
-              <a:rPr lang="en" sz="2000" b="1">
+              <a:rPr lang="en" sz="2000" b="1" dirty="0">
                 <a:solidFill>
                   <a:srgbClr val="404040"/>
                 </a:solidFill>
@@ -8234,32 +8039,19 @@
               <a:t>Total Variant Visitors: </a:t>
             </a:r>
             <a:r>
-              <a:rPr lang="en" sz="2000" b="1">
-                <a:solidFill>
-                  <a:srgbClr val="FF0000"/>
+              <a:rPr lang="en-US" sz="2000" dirty="0">
+                <a:solidFill>
+                  <a:schemeClr val="dk1"/>
                 </a:solidFill>
                 <a:highlight>
                   <a:schemeClr val="lt1"/>
                 </a:highlight>
                 <a:latin typeface="Cambria"/>
                 <a:ea typeface="Cambria"/>
-                <a:cs typeface="Cambria"/>
                 <a:sym typeface="Cambria"/>
               </a:rPr>
-              <a:t>[The number of variant visitors]</a:t>
+              <a:t>35211</a:t>
             </a:r>
-            <a:endParaRPr sz="2000">
-              <a:solidFill>
-                <a:srgbClr val="FF0000"/>
-              </a:solidFill>
-              <a:highlight>
-                <a:schemeClr val="lt1"/>
-              </a:highlight>
-              <a:latin typeface="Cambria"/>
-              <a:ea typeface="Cambria"/>
-              <a:cs typeface="Cambria"/>
-              <a:sym typeface="Cambria"/>
-            </a:endParaRPr>
           </a:p>
           <a:p>
             <a:pPr marL="0" lvl="0" indent="0" algn="l" rtl="0">
@@ -8275,7 +8067,7 @@
               <a:buNone/>
             </a:pPr>
             <a:r>
-              <a:rPr lang="en" sz="2000" b="1">
+              <a:rPr lang="en-US" sz="2000" b="1" dirty="0">
                 <a:solidFill>
                   <a:srgbClr val="404040"/>
                 </a:solidFill>
@@ -8290,7 +8082,7 @@
               <a:t>Total Control Participants:</a:t>
             </a:r>
             <a:r>
-              <a:rPr lang="en" sz="2000">
+              <a:rPr lang="en-US" sz="2000" dirty="0">
                 <a:solidFill>
                   <a:schemeClr val="dk1"/>
                 </a:solidFill>
@@ -8302,51 +8094,10 @@
                 <a:cs typeface="Cambria"/>
                 <a:sym typeface="Cambria"/>
               </a:rPr>
-              <a:t>​ </a:t>
+              <a:t>​ 34678</a:t>
             </a:r>
             <a:r>
-              <a:rPr lang="en" sz="2000" b="1">
-                <a:solidFill>
-                  <a:srgbClr val="FF0000"/>
-                </a:solidFill>
-                <a:highlight>
-                  <a:schemeClr val="lt1"/>
-                </a:highlight>
-                <a:latin typeface="Cambria"/>
-                <a:ea typeface="Cambria"/>
-                <a:cs typeface="Cambria"/>
-                <a:sym typeface="Cambria"/>
-              </a:rPr>
-              <a:t>[The number of control visitors]</a:t>
-            </a:r>
-            <a:endParaRPr sz="2000">
-              <a:solidFill>
-                <a:srgbClr val="FF0000"/>
-              </a:solidFill>
-              <a:highlight>
-                <a:schemeClr val="lt1"/>
-              </a:highlight>
-              <a:latin typeface="Cambria"/>
-              <a:ea typeface="Cambria"/>
-              <a:cs typeface="Cambria"/>
-              <a:sym typeface="Cambria"/>
-            </a:endParaRPr>
-          </a:p>
-          <a:p>
-            <a:pPr marL="0" lvl="0" indent="0" algn="l" rtl="0">
-              <a:lnSpc>
-                <a:spcPct val="108750"/>
-              </a:lnSpc>
-              <a:spcBef>
-                <a:spcPts val="0"/>
-              </a:spcBef>
-              <a:spcAft>
-                <a:spcPts val="0"/>
-              </a:spcAft>
-              <a:buNone/>
-            </a:pPr>
-            <a:r>
-              <a:rPr lang="en" sz="2000">
+              <a:rPr lang="en" sz="2000" dirty="0">
                 <a:solidFill>
                   <a:schemeClr val="dk1"/>
                 </a:solidFill>
@@ -8360,48 +8111,7 @@
               </a:rPr>
               <a:t>​</a:t>
             </a:r>
-            <a:endParaRPr sz="2000">
-              <a:solidFill>
-                <a:schemeClr val="dk1"/>
-              </a:solidFill>
-              <a:highlight>
-                <a:schemeClr val="lt1"/>
-              </a:highlight>
-              <a:latin typeface="Cambria"/>
-              <a:ea typeface="Cambria"/>
-              <a:cs typeface="Cambria"/>
-              <a:sym typeface="Cambria"/>
-            </a:endParaRPr>
-          </a:p>
-          <a:p>
-            <a:pPr marL="0" lvl="0" indent="0" algn="l" rtl="0">
-              <a:lnSpc>
-                <a:spcPct val="115000"/>
-              </a:lnSpc>
-              <a:spcBef>
-                <a:spcPts val="0"/>
-              </a:spcBef>
-              <a:spcAft>
-                <a:spcPts val="0"/>
-              </a:spcAft>
-              <a:buNone/>
-            </a:pPr>
-            <a:r>
-              <a:rPr lang="en" sz="2000" b="1">
-                <a:solidFill>
-                  <a:srgbClr val="FF0000"/>
-                </a:solidFill>
-                <a:highlight>
-                  <a:schemeClr val="lt1"/>
-                </a:highlight>
-                <a:latin typeface="Cambria"/>
-                <a:ea typeface="Cambria"/>
-                <a:cs typeface="Cambria"/>
-                <a:sym typeface="Cambria"/>
-              </a:rPr>
-              <a:t>[Update the Below Chart With Your Chart of Where Users Are From]</a:t>
-            </a:r>
-            <a:endParaRPr sz="2000">
+            <a:endParaRPr sz="2000" dirty="0">
               <a:solidFill>
                 <a:schemeClr val="dk1"/>
               </a:solidFill>
@@ -8474,30 +8184,32 @@
       </p:sp>
       <p:pic>
         <p:nvPicPr>
-          <p:cNvPr id="79" name="Google Shape;79;p17"/>
-          <p:cNvPicPr preferRelativeResize="0"/>
+          <p:cNvPr id="3" name="Picture 2">
+            <a:extLst>
+              <a:ext uri="{FF2B5EF4-FFF2-40B4-BE49-F238E27FC236}">
+                <a16:creationId xmlns:a16="http://schemas.microsoft.com/office/drawing/2014/main" id="{6EFAD339-5C0C-4F38-A5CB-06008EE82A53}"/>
+              </a:ext>
+            </a:extLst>
+          </p:cNvPr>
+          <p:cNvPicPr>
+            <a:picLocks noChangeAspect="1"/>
+          </p:cNvPicPr>
           <p:nvPr/>
         </p:nvPicPr>
         <p:blipFill>
-          <a:blip r:embed="rId3">
-            <a:alphaModFix/>
-          </a:blip>
+          <a:blip r:embed="rId3"/>
           <a:stretch>
             <a:fillRect/>
           </a:stretch>
         </p:blipFill>
         <p:spPr>
           <a:xfrm>
-            <a:off x="1900475" y="2556100"/>
-            <a:ext cx="5725150" cy="2470700"/>
+            <a:off x="2682289" y="1913222"/>
+            <a:ext cx="3948121" cy="3067024"/>
           </a:xfrm>
           <a:prstGeom prst="rect">
             <a:avLst/>
           </a:prstGeom>
-          <a:noFill/>
-          <a:ln>
-            <a:noFill/>
-          </a:ln>
         </p:spPr>
       </p:pic>
     </p:spTree>
@@ -8508,7 +8220,7 @@
 </p:sld>
 </file>
 
-<file path=ppt/slides/slide4.xml><?xml version="1.0" encoding="utf-8"?>
+<file path=ppt/slides/slide3.xml><?xml version="1.0" encoding="utf-8"?>
 <p:sld xmlns:a="http://schemas.openxmlformats.org/drawingml/2006/main" xmlns:r="http://schemas.openxmlformats.org/officeDocument/2006/relationships" xmlns:p="http://schemas.openxmlformats.org/presentationml/2006/main">
   <p:cSld>
     <p:spTree>
@@ -8588,7 +8300,7 @@
           <p:nvPr>
             <p:extLst>
               <p:ext uri="{D42A27DB-BD31-4B8C-83A1-F6EECF244321}">
-                <p14:modId xmlns:p14="http://schemas.microsoft.com/office/powerpoint/2010/main" val="3764629005"/>
+                <p14:modId xmlns:p14="http://schemas.microsoft.com/office/powerpoint/2010/main" val="578155453"/>
               </p:ext>
             </p:extLst>
           </p:nvPr>
@@ -8788,16 +8500,16 @@
                         <a:buNone/>
                       </a:pPr>
                       <a:r>
-                        <a:rPr lang="en" sz="1500" b="1">
+                        <a:rPr lang="en" sz="1500" b="0" dirty="0">
                           <a:solidFill>
-                            <a:srgbClr val="FF0000"/>
+                            <a:schemeClr val="tx1"/>
                           </a:solidFill>
                         </a:rPr>
-                        <a:t>Your Values Here</a:t>
+                        <a:t>10.7%</a:t>
                       </a:r>
-                      <a:endParaRPr sz="1500" b="1">
+                      <a:endParaRPr sz="1500" b="0" dirty="0">
                         <a:solidFill>
-                          <a:srgbClr val="FF0000"/>
+                          <a:schemeClr val="tx1"/>
                         </a:solidFill>
                       </a:endParaRPr>
                     </a:p>
@@ -8828,14 +8540,18 @@
                         <a:buNone/>
                       </a:pPr>
                       <a:r>
-                        <a:rPr lang="en" sz="1500" b="1">
+                        <a:rPr lang="en" sz="1500" b="0" dirty="0">
                           <a:solidFill>
-                            <a:srgbClr val="FF0000"/>
+                            <a:schemeClr val="tx1"/>
                           </a:solidFill>
                         </a:rPr>
-                        <a:t>Your Values Here</a:t>
+                        <a:t>10.2%</a:t>
                       </a:r>
-                      <a:endParaRPr sz="1500" b="1"/>
+                      <a:endParaRPr sz="1500" b="0" dirty="0">
+                        <a:solidFill>
+                          <a:schemeClr val="tx1"/>
+                        </a:solidFill>
+                      </a:endParaRPr>
                     </a:p>
                   </a:txBody>
                   <a:tcPr marL="91425" marR="91425" marT="91425" marB="91425">
@@ -8864,14 +8580,18 @@
                         <a:buNone/>
                       </a:pPr>
                       <a:r>
-                        <a:rPr lang="en" sz="1500" b="1">
+                        <a:rPr lang="en" sz="1500" b="0" dirty="0">
                           <a:solidFill>
-                            <a:srgbClr val="FF0000"/>
+                            <a:schemeClr val="tx1"/>
                           </a:solidFill>
                         </a:rPr>
-                        <a:t>Your Values Here</a:t>
+                        <a:t>9.4%</a:t>
                       </a:r>
-                      <a:endParaRPr sz="1500" b="1"/>
+                      <a:endParaRPr sz="1500" b="0" dirty="0">
+                        <a:solidFill>
+                          <a:schemeClr val="tx1"/>
+                        </a:solidFill>
+                      </a:endParaRPr>
                     </a:p>
                   </a:txBody>
                   <a:tcPr marL="91425" marR="91425" marT="91425" marB="91425">
@@ -8934,14 +8654,18 @@
                         <a:buNone/>
                       </a:pPr>
                       <a:r>
-                        <a:rPr lang="en" sz="1500" b="1">
+                        <a:rPr lang="en" sz="1500" b="0" dirty="0">
                           <a:solidFill>
-                            <a:srgbClr val="FF0000"/>
+                            <a:schemeClr val="tx1"/>
                           </a:solidFill>
                         </a:rPr>
-                        <a:t>Your Values Here</a:t>
+                        <a:t>15.8%</a:t>
                       </a:r>
-                      <a:endParaRPr sz="1500" b="1"/>
+                      <a:endParaRPr sz="1500" b="0" dirty="0">
+                        <a:solidFill>
+                          <a:schemeClr val="tx1"/>
+                        </a:solidFill>
+                      </a:endParaRPr>
                     </a:p>
                   </a:txBody>
                   <a:tcPr marL="91425" marR="91425" marT="91425" marB="91425">
@@ -8970,14 +8694,18 @@
                         <a:buNone/>
                       </a:pPr>
                       <a:r>
-                        <a:rPr lang="en" sz="1500" b="1">
+                        <a:rPr lang="en" sz="1500" b="0" dirty="0">
                           <a:solidFill>
-                            <a:srgbClr val="FF0000"/>
+                            <a:schemeClr val="tx1"/>
                           </a:solidFill>
                         </a:rPr>
-                        <a:t>Your Values Here</a:t>
+                        <a:t>14.9%</a:t>
                       </a:r>
-                      <a:endParaRPr sz="1500" b="1"/>
+                      <a:endParaRPr sz="1500" b="0" dirty="0">
+                        <a:solidFill>
+                          <a:schemeClr val="tx1"/>
+                        </a:solidFill>
+                      </a:endParaRPr>
                     </a:p>
                   </a:txBody>
                   <a:tcPr marL="91425" marR="91425" marT="91425" marB="91425">
@@ -9006,14 +8734,18 @@
                         <a:buNone/>
                       </a:pPr>
                       <a:r>
-                        <a:rPr lang="en" sz="1500" b="1" dirty="0">
+                        <a:rPr lang="en" sz="1500" b="0" dirty="0">
                           <a:solidFill>
-                            <a:srgbClr val="FF0000"/>
+                            <a:schemeClr val="tx1"/>
                           </a:solidFill>
                         </a:rPr>
-                        <a:t>Your Values Here</a:t>
+                        <a:t>15.4%</a:t>
                       </a:r>
-                      <a:endParaRPr sz="1500" b="1" dirty="0"/>
+                      <a:endParaRPr sz="1500" b="0" dirty="0">
+                        <a:solidFill>
+                          <a:schemeClr val="tx1"/>
+                        </a:solidFill>
+                      </a:endParaRPr>
                     </a:p>
                   </a:txBody>
                   <a:tcPr marL="91425" marR="91425" marT="91425" marB="91425">
@@ -9040,8 +8772,8 @@
         </p:nvSpPr>
         <p:spPr>
           <a:xfrm>
-            <a:off x="481400" y="2817975"/>
-            <a:ext cx="8207100" cy="846600"/>
+            <a:off x="468450" y="2571750"/>
+            <a:ext cx="8207100" cy="2308294"/>
           </a:xfrm>
           <a:prstGeom prst="rect">
             <a:avLst/>
@@ -9057,20 +8789,13 @@
           </a:bodyPr>
           <a:lstStyle/>
           <a:p>
-            <a:pPr marL="0" lvl="0" indent="0" algn="l" rtl="0">
+            <a:pPr>
               <a:lnSpc>
                 <a:spcPct val="115000"/>
               </a:lnSpc>
-              <a:spcBef>
-                <a:spcPts val="0"/>
-              </a:spcBef>
-              <a:spcAft>
-                <a:spcPts val="0"/>
-              </a:spcAft>
-              <a:buNone/>
             </a:pPr>
             <a:r>
-              <a:rPr lang="en" sz="2000" b="1">
+              <a:rPr lang="en" sz="2000" b="1" dirty="0">
                 <a:solidFill>
                   <a:srgbClr val="404040"/>
                 </a:solidFill>
@@ -9085,21 +8810,19 @@
               <a:t>Executive Summary: </a:t>
             </a:r>
             <a:r>
-              <a:rPr lang="en" sz="2000" b="1">
-                <a:solidFill>
-                  <a:srgbClr val="FF0000"/>
+              <a:rPr lang="en-US" sz="2000" dirty="0">
+                <a:solidFill>
+                  <a:srgbClr val="404040"/>
                 </a:solidFill>
                 <a:highlight>
                   <a:schemeClr val="lt1"/>
                 </a:highlight>
                 <a:latin typeface="Cambria"/>
                 <a:ea typeface="Cambria"/>
-                <a:cs typeface="Cambria"/>
-                <a:sym typeface="Cambria"/>
               </a:rPr>
-              <a:t>[What do these probabilities suggest in how the `Treatment` or `Country` are associated with conversion rates?]</a:t>
+              <a:t>Referring to the table above, it seems that the treatment has consistently positive impact on conversion rate, averaging about a 5.26% in increase. Conversely, with a large disparity in sample sizes for each of the countries, I do not believe we can state if the country of residence has a statistically significant effect. The sample size for CA users is 14 times less than that of the US, while the UK is only 3 times less.</a:t>
             </a:r>
-            <a:endParaRPr/>
+            <a:endParaRPr dirty="0"/>
           </a:p>
         </p:txBody>
       </p:sp>
@@ -9111,7 +8834,7 @@
 </p:sld>
 </file>
 
-<file path=ppt/slides/slide5.xml><?xml version="1.0" encoding="utf-8"?>
+<file path=ppt/slides/slide4.xml><?xml version="1.0" encoding="utf-8"?>
 <p:sld xmlns:a="http://schemas.openxmlformats.org/drawingml/2006/main" xmlns:r="http://schemas.openxmlformats.org/officeDocument/2006/relationships" xmlns:p="http://schemas.openxmlformats.org/presentationml/2006/main">
   <p:cSld>
     <p:spTree>
@@ -9193,7 +8916,7 @@
         <p:spPr>
           <a:xfrm>
             <a:off x="118100" y="1020700"/>
-            <a:ext cx="9076500" cy="2205000"/>
+            <a:ext cx="9076500" cy="3594800"/>
           </a:xfrm>
           <a:prstGeom prst="rect">
             <a:avLst/>
@@ -9224,7 +8947,7 @@
               <a:buNone/>
             </a:pPr>
             <a:r>
-              <a:rPr lang="en" sz="2000" b="1">
+              <a:rPr lang="en" sz="2000" b="1" dirty="0">
                 <a:solidFill>
                   <a:srgbClr val="404040"/>
                 </a:solidFill>
@@ -9239,9 +8962,9 @@
               <a:t>Treatment Conversion Rate: </a:t>
             </a:r>
             <a:r>
-              <a:rPr lang="en" sz="2000" b="1">
-                <a:solidFill>
-                  <a:srgbClr val="FF0000"/>
+              <a:rPr lang="en" sz="2000" dirty="0">
+                <a:solidFill>
+                  <a:schemeClr val="tx1"/>
                 </a:solidFill>
                 <a:highlight>
                   <a:schemeClr val="lt1"/>
@@ -9251,11 +8974,11 @@
                 <a:cs typeface="Cambria"/>
                 <a:sym typeface="Cambria"/>
               </a:rPr>
-              <a:t>[Treatment Conversion Rate]</a:t>
+              <a:t>13.138%</a:t>
             </a:r>
-            <a:endParaRPr sz="2000">
+            <a:endParaRPr sz="2000" dirty="0">
               <a:solidFill>
-                <a:srgbClr val="FF0000"/>
+                <a:schemeClr val="tx1"/>
               </a:solidFill>
               <a:highlight>
                 <a:schemeClr val="lt1"/>
@@ -9280,7 +9003,7 @@
               <a:buNone/>
             </a:pPr>
             <a:r>
-              <a:rPr lang="en" sz="2000" b="1">
+              <a:rPr lang="en" sz="2000" b="1" dirty="0">
                 <a:solidFill>
                   <a:srgbClr val="404040"/>
                 </a:solidFill>
@@ -9295,7 +9018,7 @@
               <a:t>Control Conversion Rate:</a:t>
             </a:r>
             <a:r>
-              <a:rPr lang="en" sz="2000">
+              <a:rPr lang="en" sz="2000" dirty="0">
                 <a:solidFill>
                   <a:schemeClr val="dk1"/>
                 </a:solidFill>
@@ -9307,12 +9030,26 @@
                 <a:cs typeface="Cambria"/>
                 <a:sym typeface="Cambria"/>
               </a:rPr>
-              <a:t>​ </a:t>
+              <a:t>​ 13.305%</a:t>
             </a:r>
+          </a:p>
+          <a:p>
+            <a:pPr marL="0" lvl="0" indent="0" algn="l" rtl="0">
+              <a:lnSpc>
+                <a:spcPct val="115000"/>
+              </a:lnSpc>
+              <a:spcBef>
+                <a:spcPts val="0"/>
+              </a:spcBef>
+              <a:spcAft>
+                <a:spcPts val="0"/>
+              </a:spcAft>
+              <a:buNone/>
+            </a:pPr>
             <a:r>
-              <a:rPr lang="en" sz="2000" b="1">
-                <a:solidFill>
-                  <a:srgbClr val="FF0000"/>
+              <a:rPr lang="en" sz="2000" b="1" dirty="0">
+                <a:solidFill>
+                  <a:srgbClr val="404040"/>
                 </a:solidFill>
                 <a:highlight>
                   <a:schemeClr val="lt1"/>
@@ -9322,9 +9059,39 @@
                 <a:cs typeface="Cambria"/>
                 <a:sym typeface="Cambria"/>
               </a:rPr>
-              <a:t>[Control Conversion Rate]</a:t>
+              <a:t>Delta in Treatment vs. Control Conversion Rate:</a:t>
             </a:r>
-            <a:endParaRPr sz="2000">
+            <a:r>
+              <a:rPr lang="en" sz="2000" dirty="0">
+                <a:solidFill>
+                  <a:schemeClr val="dk1"/>
+                </a:solidFill>
+                <a:highlight>
+                  <a:schemeClr val="lt1"/>
+                </a:highlight>
+                <a:latin typeface="Cambria"/>
+                <a:ea typeface="Cambria"/>
+                <a:cs typeface="Cambria"/>
+                <a:sym typeface="Cambria"/>
+              </a:rPr>
+              <a:t>​</a:t>
+            </a:r>
+            <a:r>
+              <a:rPr lang="en-US" sz="2000" dirty="0">
+                <a:solidFill>
+                  <a:schemeClr val="dk1"/>
+                </a:solidFill>
+                <a:highlight>
+                  <a:schemeClr val="lt1"/>
+                </a:highlight>
+                <a:latin typeface="Cambria"/>
+                <a:ea typeface="Cambria"/>
+                <a:cs typeface="Cambria"/>
+                <a:sym typeface="Cambria"/>
+              </a:rPr>
+              <a:t> -0.167%</a:t>
+            </a:r>
+            <a:endParaRPr lang="en-US" sz="2000" b="1" dirty="0">
               <a:solidFill>
                 <a:srgbClr val="FF0000"/>
               </a:solidFill>
@@ -9351,7 +9118,7 @@
               <a:buNone/>
             </a:pPr>
             <a:r>
-              <a:rPr lang="en" sz="2000" b="1">
+              <a:rPr lang="en-US" sz="2000" b="1" dirty="0">
                 <a:solidFill>
                   <a:srgbClr val="404040"/>
                 </a:solidFill>
@@ -9363,10 +9130,10 @@
                 <a:cs typeface="Cambria"/>
                 <a:sym typeface="Cambria"/>
               </a:rPr>
-              <a:t>Delta in Treatment vs. Control Conversion Rate:</a:t>
+              <a:t>p-value:</a:t>
             </a:r>
             <a:r>
-              <a:rPr lang="en" sz="2000">
+              <a:rPr lang="en-US" sz="2000" dirty="0">
                 <a:solidFill>
                   <a:schemeClr val="dk1"/>
                 </a:solidFill>
@@ -9381,9 +9148,9 @@
               <a:t>​ </a:t>
             </a:r>
             <a:r>
-              <a:rPr lang="en" sz="2000" b="1">
-                <a:solidFill>
-                  <a:srgbClr val="FF0000"/>
+              <a:rPr lang="en-US" sz="2000" dirty="0">
+                <a:solidFill>
+                  <a:schemeClr val="tx1"/>
                 </a:solidFill>
                 <a:highlight>
                   <a:schemeClr val="lt1"/>
@@ -9393,20 +9160,8 @@
                 <a:cs typeface="Cambria"/>
                 <a:sym typeface="Cambria"/>
               </a:rPr>
-              <a:t>[Difference in Rates]</a:t>
+              <a:t>0.0</a:t>
             </a:r>
-            <a:endParaRPr sz="2000" b="1">
-              <a:solidFill>
-                <a:srgbClr val="FF0000"/>
-              </a:solidFill>
-              <a:highlight>
-                <a:schemeClr val="lt1"/>
-              </a:highlight>
-              <a:latin typeface="Cambria"/>
-              <a:ea typeface="Cambria"/>
-              <a:cs typeface="Cambria"/>
-              <a:sym typeface="Cambria"/>
-            </a:endParaRPr>
           </a:p>
           <a:p>
             <a:pPr marL="0" lvl="0" indent="0" algn="l" rtl="0">
@@ -9422,7 +9177,7 @@
               <a:buNone/>
             </a:pPr>
             <a:r>
-              <a:rPr lang="en" sz="2000" b="1">
+              <a:rPr lang="en" sz="2000" b="1" dirty="0">
                 <a:solidFill>
                   <a:srgbClr val="404040"/>
                 </a:solidFill>
@@ -9434,10 +9189,10 @@
                 <a:cs typeface="Cambria"/>
                 <a:sym typeface="Cambria"/>
               </a:rPr>
-              <a:t>p-value:</a:t>
+              <a:t>Conclusion:</a:t>
             </a:r>
             <a:r>
-              <a:rPr lang="en" sz="2000">
+              <a:rPr lang="en" sz="2000" dirty="0">
                 <a:solidFill>
                   <a:schemeClr val="dk1"/>
                 </a:solidFill>
@@ -9452,9 +9207,9 @@
               <a:t>​ </a:t>
             </a:r>
             <a:r>
-              <a:rPr lang="en" sz="2000" b="1">
-                <a:solidFill>
-                  <a:srgbClr val="FF0000"/>
+              <a:rPr lang="en" sz="2000" dirty="0">
+                <a:solidFill>
+                  <a:schemeClr val="tx1"/>
                 </a:solidFill>
                 <a:highlight>
                   <a:schemeClr val="lt1"/>
@@ -9464,38 +9219,12 @@
                 <a:cs typeface="Cambria"/>
                 <a:sym typeface="Cambria"/>
               </a:rPr>
-              <a:t>[p-value]</a:t>
+              <a:t>Because our p-value is smaller than 0.05, our Type I margin of error,  we will reject the null hypothesis, which is that the </a:t>
             </a:r>
-            <a:endParaRPr sz="2000" b="1">
-              <a:solidFill>
-                <a:srgbClr val="FF0000"/>
-              </a:solidFill>
-              <a:highlight>
-                <a:schemeClr val="lt1"/>
-              </a:highlight>
-              <a:latin typeface="Cambria"/>
-              <a:ea typeface="Cambria"/>
-              <a:cs typeface="Cambria"/>
-              <a:sym typeface="Cambria"/>
-            </a:endParaRPr>
-          </a:p>
-          <a:p>
-            <a:pPr marL="0" lvl="0" indent="0" algn="l" rtl="0">
-              <a:lnSpc>
-                <a:spcPct val="108750"/>
-              </a:lnSpc>
-              <a:spcBef>
-                <a:spcPts val="0"/>
-              </a:spcBef>
-              <a:spcAft>
-                <a:spcPts val="0"/>
-              </a:spcAft>
-              <a:buNone/>
-            </a:pPr>
             <a:r>
-              <a:rPr lang="en" sz="2000" b="1">
-                <a:solidFill>
-                  <a:srgbClr val="404040"/>
+              <a:rPr lang="en" sz="2000" u="sng" dirty="0">
+                <a:solidFill>
+                  <a:schemeClr val="tx1"/>
                 </a:solidFill>
                 <a:highlight>
                   <a:schemeClr val="lt1"/>
@@ -9505,12 +9234,12 @@
                 <a:cs typeface="Cambria"/>
                 <a:sym typeface="Cambria"/>
               </a:rPr>
-              <a:t>Conclusion:</a:t>
+              <a:t>control</a:t>
             </a:r>
             <a:r>
-              <a:rPr lang="en" sz="2000">
-                <a:solidFill>
-                  <a:schemeClr val="dk1"/>
+              <a:rPr lang="en" sz="2000" dirty="0">
+                <a:solidFill>
+                  <a:schemeClr val="tx1"/>
                 </a:solidFill>
                 <a:highlight>
                   <a:schemeClr val="lt1"/>
@@ -9520,12 +9249,12 @@
                 <a:cs typeface="Cambria"/>
                 <a:sym typeface="Cambria"/>
               </a:rPr>
-              <a:t>​ </a:t>
+              <a:t> conversion rate is </a:t>
             </a:r>
             <a:r>
-              <a:rPr lang="en" sz="2000" b="1">
-                <a:solidFill>
-                  <a:srgbClr val="FF0000"/>
+              <a:rPr lang="en" sz="2000" u="sng" dirty="0">
+                <a:solidFill>
+                  <a:schemeClr val="tx1"/>
                 </a:solidFill>
                 <a:highlight>
                   <a:schemeClr val="lt1"/>
@@ -9535,11 +9264,146 @@
                 <a:cs typeface="Cambria"/>
                 <a:sym typeface="Cambria"/>
               </a:rPr>
-              <a:t>[Conclusion - what does the above suggest in terms of treatment and control - do you have statistically significant evidence of a difference?]</a:t>
+              <a:t>greater than or equal to</a:t>
             </a:r>
-            <a:endParaRPr sz="2000">
+            <a:r>
+              <a:rPr lang="en" sz="2000" dirty="0">
+                <a:solidFill>
+                  <a:schemeClr val="tx1"/>
+                </a:solidFill>
+                <a:highlight>
+                  <a:schemeClr val="lt1"/>
+                </a:highlight>
+                <a:latin typeface="Cambria"/>
+                <a:ea typeface="Cambria"/>
+                <a:cs typeface="Cambria"/>
+                <a:sym typeface="Cambria"/>
+              </a:rPr>
+              <a:t> the </a:t>
+            </a:r>
+            <a:r>
+              <a:rPr lang="en" sz="2000" u="sng" dirty="0">
+                <a:solidFill>
+                  <a:schemeClr val="tx1"/>
+                </a:solidFill>
+                <a:highlight>
+                  <a:schemeClr val="lt1"/>
+                </a:highlight>
+                <a:latin typeface="Cambria"/>
+                <a:ea typeface="Cambria"/>
+                <a:cs typeface="Cambria"/>
+                <a:sym typeface="Cambria"/>
+              </a:rPr>
+              <a:t>treatment</a:t>
+            </a:r>
+            <a:r>
+              <a:rPr lang="en" sz="2000" dirty="0">
+                <a:solidFill>
+                  <a:schemeClr val="tx1"/>
+                </a:solidFill>
+                <a:highlight>
+                  <a:schemeClr val="lt1"/>
+                </a:highlight>
+                <a:latin typeface="Cambria"/>
+                <a:ea typeface="Cambria"/>
+                <a:cs typeface="Cambria"/>
+                <a:sym typeface="Cambria"/>
+              </a:rPr>
+              <a:t> conversion rate. We do this in favor of the alternative hypothesis, which is that the </a:t>
+            </a:r>
+            <a:r>
+              <a:rPr lang="en" sz="2000" u="sng" dirty="0">
+                <a:solidFill>
+                  <a:schemeClr val="tx1"/>
+                </a:solidFill>
+                <a:highlight>
+                  <a:schemeClr val="lt1"/>
+                </a:highlight>
+                <a:latin typeface="Cambria"/>
+                <a:ea typeface="Cambria"/>
+                <a:cs typeface="Cambria"/>
+                <a:sym typeface="Cambria"/>
+              </a:rPr>
+              <a:t>control</a:t>
+            </a:r>
+            <a:r>
+              <a:rPr lang="en" sz="2000" dirty="0">
+                <a:solidFill>
+                  <a:schemeClr val="tx1"/>
+                </a:solidFill>
+                <a:highlight>
+                  <a:schemeClr val="lt1"/>
+                </a:highlight>
+                <a:latin typeface="Cambria"/>
+                <a:ea typeface="Cambria"/>
+                <a:cs typeface="Cambria"/>
+                <a:sym typeface="Cambria"/>
+              </a:rPr>
+              <a:t> convrate is </a:t>
+            </a:r>
+            <a:r>
+              <a:rPr lang="en" sz="2000" u="sng" dirty="0">
+                <a:solidFill>
+                  <a:schemeClr val="tx1"/>
+                </a:solidFill>
+                <a:highlight>
+                  <a:schemeClr val="lt1"/>
+                </a:highlight>
+                <a:latin typeface="Cambria"/>
+                <a:ea typeface="Cambria"/>
+                <a:cs typeface="Cambria"/>
+                <a:sym typeface="Cambria"/>
+              </a:rPr>
+              <a:t>less than</a:t>
+            </a:r>
+            <a:r>
+              <a:rPr lang="en" sz="2000" dirty="0">
+                <a:solidFill>
+                  <a:schemeClr val="tx1"/>
+                </a:solidFill>
+                <a:highlight>
+                  <a:schemeClr val="lt1"/>
+                </a:highlight>
+                <a:latin typeface="Cambria"/>
+                <a:ea typeface="Cambria"/>
+                <a:cs typeface="Cambria"/>
+                <a:sym typeface="Cambria"/>
+              </a:rPr>
+              <a:t> the </a:t>
+            </a:r>
+            <a:r>
+              <a:rPr lang="en" sz="2000" u="sng" dirty="0">
+                <a:solidFill>
+                  <a:schemeClr val="tx1"/>
+                </a:solidFill>
+                <a:highlight>
+                  <a:schemeClr val="lt1"/>
+                </a:highlight>
+                <a:latin typeface="Cambria"/>
+                <a:ea typeface="Cambria"/>
+                <a:cs typeface="Cambria"/>
+                <a:sym typeface="Cambria"/>
+              </a:rPr>
+              <a:t>treatment</a:t>
+            </a:r>
+            <a:r>
+              <a:rPr lang="en" sz="2000" dirty="0">
+                <a:solidFill>
+                  <a:schemeClr val="tx1"/>
+                </a:solidFill>
+                <a:highlight>
+                  <a:schemeClr val="lt1"/>
+                </a:highlight>
+                <a:latin typeface="Cambria"/>
+                <a:ea typeface="Cambria"/>
+                <a:cs typeface="Cambria"/>
+                <a:sym typeface="Cambria"/>
+              </a:rPr>
+              <a:t> convrate. This is because the p-value indicates that the results are unlikely to obtain this effect given our data, assuming the null hypothesis is true.</a:t>
+            </a:r>
+            <a:endParaRPr sz="2000" dirty="0">
               <a:solidFill>
-                <a:schemeClr val="dk1"/>
+                <a:schemeClr val="tx1"/>
               </a:solidFill>
               <a:highlight>
                 <a:schemeClr val="lt1"/>
@@ -9560,7 +9424,7 @@
 </p:sld>
 </file>
 
-<file path=ppt/slides/slide6.xml><?xml version="1.0" encoding="utf-8"?>
+<file path=ppt/slides/slide5.xml><?xml version="1.0" encoding="utf-8"?>
 <p:sld xmlns:a="http://schemas.openxmlformats.org/drawingml/2006/main" xmlns:r="http://schemas.openxmlformats.org/officeDocument/2006/relationships" xmlns:p="http://schemas.openxmlformats.org/presentationml/2006/main">
   <p:cSld>
     <p:spTree>
@@ -9641,8 +9505,8 @@
         </p:nvSpPr>
         <p:spPr>
           <a:xfrm>
-            <a:off x="118100" y="1020700"/>
-            <a:ext cx="9076500" cy="492600"/>
+            <a:off x="33750" y="1020700"/>
+            <a:ext cx="9076500" cy="3203924"/>
           </a:xfrm>
           <a:prstGeom prst="rect">
             <a:avLst/>
@@ -9673,7 +9537,7 @@
               <a:buNone/>
             </a:pPr>
             <a:r>
-              <a:rPr lang="en" sz="2000" b="1">
+              <a:rPr lang="en-US" sz="2000" b="1" dirty="0">
                 <a:solidFill>
                   <a:srgbClr val="404040"/>
                 </a:solidFill>
@@ -9688,7 +9552,7 @@
               <a:t>Conclusion:</a:t>
             </a:r>
             <a:r>
-              <a:rPr lang="en" sz="2000">
+              <a:rPr lang="en-US" sz="2000" dirty="0">
                 <a:solidFill>
                   <a:schemeClr val="dk1"/>
                 </a:solidFill>
@@ -9700,12 +9564,64 @@
                 <a:cs typeface="Cambria"/>
                 <a:sym typeface="Cambria"/>
               </a:rPr>
-              <a:t>​ </a:t>
+              <a:t>​ Using a logistic regression model, it was determined that the p-values for results from visitors in the US and UK are greater than 0.05, which suggests that they do not impact conversion rate in a manner that is statistically significant. Therefore, we can conclude that the country the user contacts the web site from is unlikely to impact their conversion rate. Meanwhile, the p-value for the type of page the user is given remains at 0.0</a:t>
             </a:r>
+            <a:endParaRPr lang="en-US" sz="2000" b="1" dirty="0">
+              <a:solidFill>
+                <a:schemeClr val="dk1"/>
+              </a:solidFill>
+              <a:highlight>
+                <a:schemeClr val="lt1"/>
+              </a:highlight>
+              <a:latin typeface="Cambria"/>
+              <a:ea typeface="Cambria"/>
+              <a:cs typeface="Cambria"/>
+              <a:sym typeface="Cambria"/>
+            </a:endParaRPr>
+          </a:p>
+          <a:p>
+            <a:pPr marL="0" lvl="0" indent="0" algn="l" rtl="0">
+              <a:lnSpc>
+                <a:spcPct val="108750"/>
+              </a:lnSpc>
+              <a:spcBef>
+                <a:spcPts val="0"/>
+              </a:spcBef>
+              <a:spcAft>
+                <a:spcPts val="0"/>
+              </a:spcAft>
+              <a:buNone/>
+            </a:pPr>
+            <a:endParaRPr lang="en-US" sz="2000" b="1" dirty="0">
+              <a:solidFill>
+                <a:schemeClr val="dk1"/>
+              </a:solidFill>
+              <a:highlight>
+                <a:schemeClr val="lt1"/>
+              </a:highlight>
+              <a:latin typeface="Cambria"/>
+              <a:ea typeface="Cambria"/>
+              <a:cs typeface="Cambria"/>
+              <a:sym typeface="Cambria"/>
+            </a:endParaRPr>
+          </a:p>
+          <a:p>
+            <a:pPr marL="0" lvl="0" indent="0" algn="l" rtl="0">
+              <a:lnSpc>
+                <a:spcPct val="108750"/>
+              </a:lnSpc>
+              <a:spcBef>
+                <a:spcPts val="0"/>
+              </a:spcBef>
+              <a:spcAft>
+                <a:spcPts val="0"/>
+              </a:spcAft>
+              <a:buNone/>
+            </a:pPr>
             <a:r>
-              <a:rPr lang="en" sz="2000" b="1">
-                <a:solidFill>
-                  <a:srgbClr val="FF0000"/>
+              <a:rPr lang="en-US" sz="2000" b="1" dirty="0">
+                <a:solidFill>
+                  <a:schemeClr val="dk1"/>
                 </a:solidFill>
                 <a:highlight>
                   <a:schemeClr val="lt1"/>
@@ -9715,11 +9631,11 @@
                 <a:cs typeface="Cambria"/>
                 <a:sym typeface="Cambria"/>
               </a:rPr>
-              <a:t>[Are there differences in conversion rates between countries?]</a:t>
+              <a:t>There may be confounding variables due to the countries that were selected, the number of countries tested in, and the duration and frequency of testing. </a:t>
             </a:r>
-            <a:endParaRPr sz="2000" b="1">
+            <a:endParaRPr lang="en-US" sz="2000" dirty="0">
               <a:solidFill>
-                <a:srgbClr val="FF0000"/>
+                <a:schemeClr val="dk1"/>
               </a:solidFill>
               <a:highlight>
                 <a:schemeClr val="lt1"/>

</xml_diff>